<commit_message>
last commit before restructure of RDF approach in exercises.
</commit_message>
<xml_diff>
--- a/Annual2017-EU/documents/SourceImagesForExercises.pptx
+++ b/Annual2017-EU/documents/SourceImagesForExercises.pptx
@@ -243,7 +243,7 @@
           <a:p>
             <a:fld id="{08441275-3FB1-4ACB-948E-90AA8F0B5771}" type="datetimeFigureOut">
               <a:rPr lang="en-US" smtClean="0"/>
-              <a:t>6/26/2017</a:t>
+              <a:t>8/10/2017</a:t>
             </a:fld>
             <a:endParaRPr lang="en-US"/>
           </a:p>
@@ -411,7 +411,7 @@
           <a:p>
             <a:fld id="{08441275-3FB1-4ACB-948E-90AA8F0B5771}" type="datetimeFigureOut">
               <a:rPr lang="en-US" smtClean="0"/>
-              <a:t>6/26/2017</a:t>
+              <a:t>8/10/2017</a:t>
             </a:fld>
             <a:endParaRPr lang="en-US"/>
           </a:p>
@@ -589,7 +589,7 @@
           <a:p>
             <a:fld id="{08441275-3FB1-4ACB-948E-90AA8F0B5771}" type="datetimeFigureOut">
               <a:rPr lang="en-US" smtClean="0"/>
-              <a:t>6/26/2017</a:t>
+              <a:t>8/10/2017</a:t>
             </a:fld>
             <a:endParaRPr lang="en-US"/>
           </a:p>
@@ -757,7 +757,7 @@
           <a:p>
             <a:fld id="{08441275-3FB1-4ACB-948E-90AA8F0B5771}" type="datetimeFigureOut">
               <a:rPr lang="en-US" smtClean="0"/>
-              <a:t>6/26/2017</a:t>
+              <a:t>8/10/2017</a:t>
             </a:fld>
             <a:endParaRPr lang="en-US"/>
           </a:p>
@@ -1002,7 +1002,7 @@
           <a:p>
             <a:fld id="{08441275-3FB1-4ACB-948E-90AA8F0B5771}" type="datetimeFigureOut">
               <a:rPr lang="en-US" smtClean="0"/>
-              <a:t>6/26/2017</a:t>
+              <a:t>8/10/2017</a:t>
             </a:fld>
             <a:endParaRPr lang="en-US"/>
           </a:p>
@@ -1231,7 +1231,7 @@
           <a:p>
             <a:fld id="{08441275-3FB1-4ACB-948E-90AA8F0B5771}" type="datetimeFigureOut">
               <a:rPr lang="en-US" smtClean="0"/>
-              <a:t>6/26/2017</a:t>
+              <a:t>8/10/2017</a:t>
             </a:fld>
             <a:endParaRPr lang="en-US"/>
           </a:p>
@@ -1595,7 +1595,7 @@
           <a:p>
             <a:fld id="{08441275-3FB1-4ACB-948E-90AA8F0B5771}" type="datetimeFigureOut">
               <a:rPr lang="en-US" smtClean="0"/>
-              <a:t>6/26/2017</a:t>
+              <a:t>8/10/2017</a:t>
             </a:fld>
             <a:endParaRPr lang="en-US"/>
           </a:p>
@@ -1712,7 +1712,7 @@
           <a:p>
             <a:fld id="{08441275-3FB1-4ACB-948E-90AA8F0B5771}" type="datetimeFigureOut">
               <a:rPr lang="en-US" smtClean="0"/>
-              <a:t>6/26/2017</a:t>
+              <a:t>8/10/2017</a:t>
             </a:fld>
             <a:endParaRPr lang="en-US"/>
           </a:p>
@@ -1807,7 +1807,7 @@
           <a:p>
             <a:fld id="{08441275-3FB1-4ACB-948E-90AA8F0B5771}" type="datetimeFigureOut">
               <a:rPr lang="en-US" smtClean="0"/>
-              <a:t>6/26/2017</a:t>
+              <a:t>8/10/2017</a:t>
             </a:fld>
             <a:endParaRPr lang="en-US"/>
           </a:p>
@@ -2082,7 +2082,7 @@
           <a:p>
             <a:fld id="{08441275-3FB1-4ACB-948E-90AA8F0B5771}" type="datetimeFigureOut">
               <a:rPr lang="en-US" smtClean="0"/>
-              <a:t>6/26/2017</a:t>
+              <a:t>8/10/2017</a:t>
             </a:fld>
             <a:endParaRPr lang="en-US"/>
           </a:p>
@@ -2334,7 +2334,7 @@
           <a:p>
             <a:fld id="{08441275-3FB1-4ACB-948E-90AA8F0B5771}" type="datetimeFigureOut">
               <a:rPr lang="en-US" smtClean="0"/>
-              <a:t>6/26/2017</a:t>
+              <a:t>8/10/2017</a:t>
             </a:fld>
             <a:endParaRPr lang="en-US"/>
           </a:p>
@@ -2545,7 +2545,7 @@
           <a:p>
             <a:fld id="{08441275-3FB1-4ACB-948E-90AA8F0B5771}" type="datetimeFigureOut">
               <a:rPr lang="en-US" smtClean="0"/>
-              <a:t>6/26/2017</a:t>
+              <a:t>8/10/2017</a:t>
             </a:fld>
             <a:endParaRPr lang="en-US"/>
           </a:p>
@@ -3772,7 +3772,7 @@
         </p:nvSpPr>
         <p:spPr>
           <a:xfrm>
-            <a:off x="3765755" y="373626"/>
+            <a:off x="1034847" y="4659998"/>
             <a:ext cx="3272998" cy="1179871"/>
           </a:xfrm>
           <a:prstGeom prst="roundRect">
@@ -3821,7 +3821,7 @@
         </p:nvSpPr>
         <p:spPr>
           <a:xfrm>
-            <a:off x="3765755" y="1991033"/>
+            <a:off x="862153" y="2661108"/>
             <a:ext cx="3272998" cy="1179871"/>
           </a:xfrm>
           <a:prstGeom prst="roundRect">
@@ -3857,7 +3857,7 @@
             <a:pPr algn="ctr"/>
             <a:r>
               <a:rPr lang="en-US" sz="2800" dirty="0"/>
-              <a:t>  Spreadsheet</a:t>
+              <a:t>       RDF                                                      Spreadsheet</a:t>
             </a:r>
           </a:p>
         </p:txBody>
@@ -3870,7 +3870,7 @@
         </p:nvSpPr>
         <p:spPr>
           <a:xfrm>
-            <a:off x="3754205" y="4576666"/>
+            <a:off x="5713634" y="4956676"/>
             <a:ext cx="3272998" cy="1179871"/>
           </a:xfrm>
           <a:prstGeom prst="roundRect">
@@ -3911,78 +3911,6 @@
           </a:p>
         </p:txBody>
       </p:sp>
-      <p:cxnSp>
-        <p:nvCxnSpPr>
-          <p:cNvPr id="6" name="Straight Arrow Connector 5"/>
-          <p:cNvCxnSpPr>
-            <a:stCxn id="2" idx="2"/>
-            <a:endCxn id="3" idx="0"/>
-          </p:cNvCxnSpPr>
-          <p:nvPr/>
-        </p:nvCxnSpPr>
-        <p:spPr>
-          <a:xfrm>
-            <a:off x="5402254" y="1553497"/>
-            <a:ext cx="0" cy="437536"/>
-          </a:xfrm>
-          <a:prstGeom prst="straightConnector1">
-            <a:avLst/>
-          </a:prstGeom>
-          <a:ln w="47625">
-            <a:tailEnd type="triangle"/>
-          </a:ln>
-        </p:spPr>
-        <p:style>
-          <a:lnRef idx="1">
-            <a:schemeClr val="accent1"/>
-          </a:lnRef>
-          <a:fillRef idx="0">
-            <a:schemeClr val="accent1"/>
-          </a:fillRef>
-          <a:effectRef idx="0">
-            <a:schemeClr val="accent1"/>
-          </a:effectRef>
-          <a:fontRef idx="minor">
-            <a:schemeClr val="tx1"/>
-          </a:fontRef>
-        </p:style>
-      </p:cxnSp>
-      <p:cxnSp>
-        <p:nvCxnSpPr>
-          <p:cNvPr id="8" name="Straight Arrow Connector 7"/>
-          <p:cNvCxnSpPr>
-            <a:stCxn id="3" idx="2"/>
-            <a:endCxn id="4" idx="0"/>
-          </p:cNvCxnSpPr>
-          <p:nvPr/>
-        </p:nvCxnSpPr>
-        <p:spPr>
-          <a:xfrm flipH="1">
-            <a:off x="5390704" y="3170904"/>
-            <a:ext cx="11550" cy="1405762"/>
-          </a:xfrm>
-          <a:prstGeom prst="straightConnector1">
-            <a:avLst/>
-          </a:prstGeom>
-          <a:ln w="47625">
-            <a:tailEnd type="triangle"/>
-          </a:ln>
-        </p:spPr>
-        <p:style>
-          <a:lnRef idx="1">
-            <a:schemeClr val="accent1"/>
-          </a:lnRef>
-          <a:fillRef idx="0">
-            <a:schemeClr val="accent1"/>
-          </a:fillRef>
-          <a:effectRef idx="0">
-            <a:schemeClr val="accent1"/>
-          </a:effectRef>
-          <a:fontRef idx="minor">
-            <a:schemeClr val="tx1"/>
-          </a:fontRef>
-        </p:style>
-      </p:cxnSp>
       <p:sp>
         <p:nvSpPr>
           <p:cNvPr id="9" name="Arc 8"/>
@@ -3990,14 +3918,14 @@
           <p:nvPr/>
         </p:nvSpPr>
         <p:spPr>
-          <a:xfrm>
-            <a:off x="5465135" y="3608440"/>
+          <a:xfrm rot="21384502">
+            <a:off x="4611439" y="601708"/>
             <a:ext cx="914400" cy="695632"/>
           </a:xfrm>
           <a:prstGeom prst="arc">
             <a:avLst>
-              <a:gd name="adj1" fmla="val 3350418"/>
-              <a:gd name="adj2" fmla="val 17007831"/>
+              <a:gd name="adj1" fmla="val 589571"/>
+              <a:gd name="adj2" fmla="val 12549778"/>
             </a:avLst>
           </a:prstGeom>
           <a:ln w="38100">
@@ -4054,7 +3982,7 @@
         </p:blipFill>
         <p:spPr bwMode="auto">
           <a:xfrm>
-            <a:off x="6036489" y="3328674"/>
+            <a:off x="7995918" y="3708684"/>
             <a:ext cx="806763" cy="559532"/>
           </a:xfrm>
           <a:prstGeom prst="rect">
@@ -4095,7 +4023,7 @@
         </p:blipFill>
         <p:spPr bwMode="auto">
           <a:xfrm>
-            <a:off x="3841108" y="511891"/>
+            <a:off x="1217156" y="4815725"/>
             <a:ext cx="913172" cy="913172"/>
           </a:xfrm>
           <a:prstGeom prst="rect">
@@ -4136,7 +4064,7 @@
         </p:blipFill>
         <p:spPr bwMode="auto">
           <a:xfrm>
-            <a:off x="3755392" y="2092373"/>
+            <a:off x="891041" y="2792701"/>
             <a:ext cx="844959" cy="844959"/>
           </a:xfrm>
           <a:prstGeom prst="rect">
@@ -4177,7 +4105,7 @@
         </p:blipFill>
         <p:spPr bwMode="auto">
           <a:xfrm>
-            <a:off x="7227985" y="4332769"/>
+            <a:off x="9187414" y="4712779"/>
             <a:ext cx="806763" cy="559532"/>
           </a:xfrm>
           <a:prstGeom prst="rect">
@@ -4218,7 +4146,7 @@
         </p:blipFill>
         <p:spPr bwMode="auto">
           <a:xfrm>
-            <a:off x="3955166" y="4756157"/>
+            <a:off x="5914595" y="5136167"/>
             <a:ext cx="677084" cy="720302"/>
           </a:xfrm>
           <a:prstGeom prst="rect">
@@ -4259,7 +4187,7 @@
         </p:blipFill>
         <p:spPr bwMode="auto">
           <a:xfrm>
-            <a:off x="8474852" y="4618001"/>
+            <a:off x="10434281" y="4998011"/>
             <a:ext cx="1097199" cy="1097199"/>
           </a:xfrm>
           <a:prstGeom prst="rect">
@@ -4288,7 +4216,7 @@
         </p:nvCxnSpPr>
         <p:spPr>
           <a:xfrm flipV="1">
-            <a:off x="7027203" y="5166601"/>
+            <a:off x="8986632" y="5546611"/>
             <a:ext cx="1447649" cy="1"/>
           </a:xfrm>
           <a:prstGeom prst="straightConnector1">
@@ -4321,7 +4249,7 @@
         </p:nvSpPr>
         <p:spPr>
           <a:xfrm>
-            <a:off x="1931177" y="511891"/>
+            <a:off x="1600201" y="5824023"/>
             <a:ext cx="1796902" cy="954107"/>
           </a:xfrm>
           <a:prstGeom prst="rect">
@@ -4344,14 +4272,14 @@
       </p:sp>
       <p:sp>
         <p:nvSpPr>
-          <p:cNvPr id="18" name="TextBox 17"/>
+          <p:cNvPr id="19" name="TextBox 18"/>
           <p:cNvSpPr txBox="1"/>
           <p:nvPr/>
         </p:nvSpPr>
         <p:spPr>
           <a:xfrm>
-            <a:off x="2041920" y="2113621"/>
-            <a:ext cx="1686159" cy="954107"/>
+            <a:off x="6261250" y="6136547"/>
+            <a:ext cx="1883849" cy="523220"/>
           </a:xfrm>
           <a:prstGeom prst="rect">
             <a:avLst/>
@@ -4373,20 +4301,20 @@
           <a:p>
             <a:r>
               <a:rPr lang="en-US" dirty="0"/>
-              <a:t>Machine Readable</a:t>
-            </a:r>
-          </a:p>
-        </p:txBody>
-      </p:sp>
-      <p:sp>
-        <p:nvSpPr>
-          <p:cNvPr id="19" name="TextBox 18"/>
+              <a:t>Linked Data</a:t>
+            </a:r>
+          </a:p>
+        </p:txBody>
+      </p:sp>
+      <p:sp>
+        <p:nvSpPr>
+          <p:cNvPr id="20" name="TextBox 19"/>
           <p:cNvSpPr txBox="1"/>
           <p:nvPr/>
         </p:nvSpPr>
         <p:spPr>
           <a:xfrm>
-            <a:off x="1844230" y="4797269"/>
+            <a:off x="10164695" y="4398388"/>
             <a:ext cx="1883849" cy="523220"/>
           </a:xfrm>
           <a:prstGeom prst="rect">
@@ -4409,43 +4337,277 @@
           <a:p>
             <a:r>
               <a:rPr lang="en-US" dirty="0"/>
-              <a:t>Linked Data</a:t>
-            </a:r>
-          </a:p>
-        </p:txBody>
-      </p:sp>
-      <p:sp>
-        <p:nvSpPr>
-          <p:cNvPr id="20" name="TextBox 19"/>
-          <p:cNvSpPr txBox="1"/>
+              <a:t>Query, Vis</a:t>
+            </a:r>
+          </a:p>
+        </p:txBody>
+      </p:sp>
+      <p:sp>
+        <p:nvSpPr>
+          <p:cNvPr id="21" name="Rectangle: Rounded Corners 20"/>
+          <p:cNvSpPr/>
           <p:nvPr/>
         </p:nvSpPr>
         <p:spPr>
           <a:xfrm>
-            <a:off x="8205266" y="4018378"/>
-            <a:ext cx="1883849" cy="523220"/>
+            <a:off x="862153" y="341609"/>
+            <a:ext cx="3272998" cy="1179871"/>
+          </a:xfrm>
+          <a:prstGeom prst="roundRect">
+            <a:avLst/>
+          </a:prstGeom>
+          <a:solidFill>
+            <a:schemeClr val="accent6">
+              <a:lumMod val="60000"/>
+              <a:lumOff val="40000"/>
+            </a:schemeClr>
+          </a:solidFill>
+        </p:spPr>
+        <p:style>
+          <a:lnRef idx="2">
+            <a:schemeClr val="accent1">
+              <a:shade val="50000"/>
+            </a:schemeClr>
+          </a:lnRef>
+          <a:fillRef idx="1">
+            <a:schemeClr val="accent1"/>
+          </a:fillRef>
+          <a:effectRef idx="0">
+            <a:schemeClr val="accent1"/>
+          </a:effectRef>
+          <a:fontRef idx="minor">
+            <a:schemeClr val="lt1"/>
+          </a:fontRef>
+        </p:style>
+        <p:txBody>
+          <a:bodyPr rtlCol="0" anchor="ctr"/>
+          <a:lstStyle/>
+          <a:p>
+            <a:pPr algn="ctr"/>
+            <a:r>
+              <a:rPr lang="en-US" sz="2800" dirty="0"/>
+              <a:t>  Neo4j</a:t>
+            </a:r>
+          </a:p>
+          <a:p>
+            <a:pPr algn="ctr"/>
+            <a:r>
+              <a:rPr lang="en-US" sz="2800" dirty="0"/>
+              <a:t>         Spreadsheet</a:t>
+            </a:r>
+          </a:p>
+        </p:txBody>
+      </p:sp>
+      <p:cxnSp>
+        <p:nvCxnSpPr>
+          <p:cNvPr id="22" name="Straight Arrow Connector 21"/>
+          <p:cNvCxnSpPr>
+            <a:stCxn id="21" idx="2"/>
+          </p:cNvCxnSpPr>
+          <p:nvPr/>
+        </p:nvCxnSpPr>
+        <p:spPr>
+          <a:xfrm>
+            <a:off x="2498652" y="1521480"/>
+            <a:ext cx="0" cy="819019"/>
+          </a:xfrm>
+          <a:prstGeom prst="straightConnector1">
+            <a:avLst/>
+          </a:prstGeom>
+          <a:ln w="47625">
+            <a:tailEnd type="triangle"/>
+          </a:ln>
+        </p:spPr>
+        <p:style>
+          <a:lnRef idx="1">
+            <a:schemeClr val="accent1"/>
+          </a:lnRef>
+          <a:fillRef idx="0">
+            <a:schemeClr val="accent1"/>
+          </a:fillRef>
+          <a:effectRef idx="0">
+            <a:schemeClr val="accent1"/>
+          </a:effectRef>
+          <a:fontRef idx="minor">
+            <a:schemeClr val="tx1"/>
+          </a:fontRef>
+        </p:style>
+      </p:cxnSp>
+      <p:pic>
+        <p:nvPicPr>
+          <p:cNvPr id="23" name="Picture 6" descr="Image result for spreadsheet icon"/>
+          <p:cNvPicPr>
+            <a:picLocks noChangeAspect="1" noChangeArrowheads="1"/>
+          </p:cNvPicPr>
+          <p:nvPr/>
+        </p:nvPicPr>
+        <p:blipFill>
+          <a:blip r:embed="rId4">
+            <a:extLst>
+              <a:ext uri="{28A0092B-C50C-407E-A947-70E740481C1C}">
+                <a14:useLocalDpi xmlns:a14="http://schemas.microsoft.com/office/drawing/2010/main" val="0"/>
+              </a:ext>
+            </a:extLst>
+          </a:blip>
+          <a:srcRect/>
+          <a:stretch>
+            <a:fillRect/>
+          </a:stretch>
+        </p:blipFill>
+        <p:spPr bwMode="auto">
+          <a:xfrm>
+            <a:off x="891041" y="931545"/>
+            <a:ext cx="844959" cy="844959"/>
           </a:xfrm>
           <a:prstGeom prst="rect">
             <a:avLst/>
           </a:prstGeom>
           <a:noFill/>
-        </p:spPr>
-        <p:txBody>
-          <a:bodyPr wrap="square" rtlCol="0">
-            <a:spAutoFit/>
-          </a:bodyPr>
-          <a:lstStyle>
-            <a:defPPr>
-              <a:defRPr lang="en-US"/>
-            </a:defPPr>
-            <a:lvl1pPr>
-              <a:defRPr sz="2800"/>
-            </a:lvl1pPr>
-          </a:lstStyle>
-          <a:p>
-            <a:r>
-              <a:rPr lang="en-US" dirty="0"/>
-              <a:t>Query, Vis</a:t>
+          <a:extLst>
+            <a:ext uri="{909E8E84-426E-40DD-AFC4-6F175D3DCCD1}">
+              <a14:hiddenFill xmlns:a14="http://schemas.microsoft.com/office/drawing/2010/main">
+                <a:solidFill>
+                  <a:srgbClr val="FFFFFF"/>
+                </a:solidFill>
+              </a14:hiddenFill>
+            </a:ext>
+          </a:extLst>
+        </p:spPr>
+      </p:pic>
+      <p:pic>
+        <p:nvPicPr>
+          <p:cNvPr id="24" name="Picture 4" descr="C:\_sandbox\sas\Conferences\PhUSE2014\images\R.png"/>
+          <p:cNvPicPr>
+            <a:picLocks noChangeAspect="1" noChangeArrowheads="1"/>
+          </p:cNvPicPr>
+          <p:nvPr/>
+        </p:nvPicPr>
+        <p:blipFill>
+          <a:blip r:embed="rId2" cstate="print">
+            <a:extLst>
+              <a:ext uri="{28A0092B-C50C-407E-A947-70E740481C1C}">
+                <a14:useLocalDpi xmlns:a14="http://schemas.microsoft.com/office/drawing/2010/main" val="0"/>
+              </a:ext>
+            </a:extLst>
+          </a:blip>
+          <a:srcRect/>
+          <a:stretch>
+            <a:fillRect/>
+          </a:stretch>
+        </p:blipFill>
+        <p:spPr bwMode="auto">
+          <a:xfrm>
+            <a:off x="2913520" y="1681089"/>
+            <a:ext cx="806763" cy="559532"/>
+          </a:xfrm>
+          <a:prstGeom prst="rect">
+            <a:avLst/>
+          </a:prstGeom>
+          <a:noFill/>
+          <a:extLst>
+            <a:ext uri="{909E8E84-426E-40DD-AFC4-6F175D3DCCD1}">
+              <a14:hiddenFill xmlns:a14="http://schemas.microsoft.com/office/drawing/2010/main">
+                <a:solidFill>
+                  <a:srgbClr val="FFFFFF"/>
+                </a:solidFill>
+              </a14:hiddenFill>
+            </a:ext>
+          </a:extLst>
+        </p:spPr>
+      </p:pic>
+      <p:sp>
+        <p:nvSpPr>
+          <p:cNvPr id="25" name="Arc 24"/>
+          <p:cNvSpPr/>
+          <p:nvPr/>
+        </p:nvSpPr>
+        <p:spPr>
+          <a:xfrm>
+            <a:off x="7576964" y="4140850"/>
+            <a:ext cx="914400" cy="695632"/>
+          </a:xfrm>
+          <a:prstGeom prst="arc">
+            <a:avLst>
+              <a:gd name="adj1" fmla="val 3350418"/>
+              <a:gd name="adj2" fmla="val 17007831"/>
+            </a:avLst>
+          </a:prstGeom>
+          <a:ln w="38100">
+            <a:solidFill>
+              <a:srgbClr val="FF0000"/>
+            </a:solidFill>
+            <a:headEnd type="triangle"/>
+            <a:tailEnd type="none"/>
+          </a:ln>
+        </p:spPr>
+        <p:style>
+          <a:lnRef idx="1">
+            <a:schemeClr val="accent1"/>
+          </a:lnRef>
+          <a:fillRef idx="0">
+            <a:schemeClr val="accent1"/>
+          </a:fillRef>
+          <a:effectRef idx="0">
+            <a:schemeClr val="accent1"/>
+          </a:effectRef>
+          <a:fontRef idx="minor">
+            <a:schemeClr val="tx1"/>
+          </a:fontRef>
+        </p:style>
+        <p:txBody>
+          <a:bodyPr rtlCol="0" anchor="ctr"/>
+          <a:lstStyle/>
+          <a:p>
+            <a:pPr algn="ctr"/>
+            <a:endParaRPr lang="en-US"/>
+          </a:p>
+        </p:txBody>
+      </p:sp>
+      <p:sp>
+        <p:nvSpPr>
+          <p:cNvPr id="29" name="Rectangle: Rounded Corners 28"/>
+          <p:cNvSpPr/>
+          <p:nvPr/>
+        </p:nvSpPr>
+        <p:spPr>
+          <a:xfrm>
+            <a:off x="5896460" y="1568544"/>
+            <a:ext cx="3272998" cy="1179871"/>
+          </a:xfrm>
+          <a:prstGeom prst="roundRect">
+            <a:avLst/>
+          </a:prstGeom>
+          <a:solidFill>
+            <a:schemeClr val="accent6">
+              <a:lumMod val="60000"/>
+              <a:lumOff val="40000"/>
+            </a:schemeClr>
+          </a:solidFill>
+        </p:spPr>
+        <p:style>
+          <a:lnRef idx="2">
+            <a:schemeClr val="accent1">
+              <a:shade val="50000"/>
+            </a:schemeClr>
+          </a:lnRef>
+          <a:fillRef idx="1">
+            <a:schemeClr val="accent1"/>
+          </a:fillRef>
+          <a:effectRef idx="0">
+            <a:schemeClr val="accent1"/>
+          </a:effectRef>
+          <a:fontRef idx="minor">
+            <a:schemeClr val="lt1"/>
+          </a:fontRef>
+        </p:style>
+        <p:txBody>
+          <a:bodyPr rtlCol="0" anchor="ctr"/>
+          <a:lstStyle/>
+          <a:p>
+            <a:pPr algn="ctr"/>
+            <a:r>
+              <a:rPr lang="en-US" sz="2800" dirty="0"/>
+              <a:t>       RDF                                                      Spreadsheet</a:t>
             </a:r>
           </a:p>
         </p:txBody>

</xml_diff>

<commit_message>
Updates to new format.
</commit_message>
<xml_diff>
--- a/Annual2017-EU/documents/SourceImagesForExercises.pptx
+++ b/Annual2017-EU/documents/SourceImagesForExercises.pptx
@@ -243,7 +243,7 @@
           <a:p>
             <a:fld id="{08441275-3FB1-4ACB-948E-90AA8F0B5771}" type="datetimeFigureOut">
               <a:rPr lang="en-US" smtClean="0"/>
-              <a:t>8/10/2017</a:t>
+              <a:t>8/21/2017</a:t>
             </a:fld>
             <a:endParaRPr lang="en-US"/>
           </a:p>
@@ -411,7 +411,7 @@
           <a:p>
             <a:fld id="{08441275-3FB1-4ACB-948E-90AA8F0B5771}" type="datetimeFigureOut">
               <a:rPr lang="en-US" smtClean="0"/>
-              <a:t>8/10/2017</a:t>
+              <a:t>8/21/2017</a:t>
             </a:fld>
             <a:endParaRPr lang="en-US"/>
           </a:p>
@@ -589,7 +589,7 @@
           <a:p>
             <a:fld id="{08441275-3FB1-4ACB-948E-90AA8F0B5771}" type="datetimeFigureOut">
               <a:rPr lang="en-US" smtClean="0"/>
-              <a:t>8/10/2017</a:t>
+              <a:t>8/21/2017</a:t>
             </a:fld>
             <a:endParaRPr lang="en-US"/>
           </a:p>
@@ -757,7 +757,7 @@
           <a:p>
             <a:fld id="{08441275-3FB1-4ACB-948E-90AA8F0B5771}" type="datetimeFigureOut">
               <a:rPr lang="en-US" smtClean="0"/>
-              <a:t>8/10/2017</a:t>
+              <a:t>8/21/2017</a:t>
             </a:fld>
             <a:endParaRPr lang="en-US"/>
           </a:p>
@@ -1002,7 +1002,7 @@
           <a:p>
             <a:fld id="{08441275-3FB1-4ACB-948E-90AA8F0B5771}" type="datetimeFigureOut">
               <a:rPr lang="en-US" smtClean="0"/>
-              <a:t>8/10/2017</a:t>
+              <a:t>8/21/2017</a:t>
             </a:fld>
             <a:endParaRPr lang="en-US"/>
           </a:p>
@@ -1231,7 +1231,7 @@
           <a:p>
             <a:fld id="{08441275-3FB1-4ACB-948E-90AA8F0B5771}" type="datetimeFigureOut">
               <a:rPr lang="en-US" smtClean="0"/>
-              <a:t>8/10/2017</a:t>
+              <a:t>8/21/2017</a:t>
             </a:fld>
             <a:endParaRPr lang="en-US"/>
           </a:p>
@@ -1595,7 +1595,7 @@
           <a:p>
             <a:fld id="{08441275-3FB1-4ACB-948E-90AA8F0B5771}" type="datetimeFigureOut">
               <a:rPr lang="en-US" smtClean="0"/>
-              <a:t>8/10/2017</a:t>
+              <a:t>8/21/2017</a:t>
             </a:fld>
             <a:endParaRPr lang="en-US"/>
           </a:p>
@@ -1712,7 +1712,7 @@
           <a:p>
             <a:fld id="{08441275-3FB1-4ACB-948E-90AA8F0B5771}" type="datetimeFigureOut">
               <a:rPr lang="en-US" smtClean="0"/>
-              <a:t>8/10/2017</a:t>
+              <a:t>8/21/2017</a:t>
             </a:fld>
             <a:endParaRPr lang="en-US"/>
           </a:p>
@@ -1807,7 +1807,7 @@
           <a:p>
             <a:fld id="{08441275-3FB1-4ACB-948E-90AA8F0B5771}" type="datetimeFigureOut">
               <a:rPr lang="en-US" smtClean="0"/>
-              <a:t>8/10/2017</a:t>
+              <a:t>8/21/2017</a:t>
             </a:fld>
             <a:endParaRPr lang="en-US"/>
           </a:p>
@@ -2082,7 +2082,7 @@
           <a:p>
             <a:fld id="{08441275-3FB1-4ACB-948E-90AA8F0B5771}" type="datetimeFigureOut">
               <a:rPr lang="en-US" smtClean="0"/>
-              <a:t>8/10/2017</a:t>
+              <a:t>8/21/2017</a:t>
             </a:fld>
             <a:endParaRPr lang="en-US"/>
           </a:p>
@@ -2334,7 +2334,7 @@
           <a:p>
             <a:fld id="{08441275-3FB1-4ACB-948E-90AA8F0B5771}" type="datetimeFigureOut">
               <a:rPr lang="en-US" smtClean="0"/>
-              <a:t>8/10/2017</a:t>
+              <a:t>8/21/2017</a:t>
             </a:fld>
             <a:endParaRPr lang="en-US"/>
           </a:p>
@@ -2545,7 +2545,7 @@
           <a:p>
             <a:fld id="{08441275-3FB1-4ACB-948E-90AA8F0B5771}" type="datetimeFigureOut">
               <a:rPr lang="en-US" smtClean="0"/>
-              <a:t>8/10/2017</a:t>
+              <a:t>8/21/2017</a:t>
             </a:fld>
             <a:endParaRPr lang="en-US"/>
           </a:p>
@@ -3772,7 +3772,7 @@
         </p:nvSpPr>
         <p:spPr>
           <a:xfrm>
-            <a:off x="1034847" y="4659998"/>
+            <a:off x="948500" y="4659998"/>
             <a:ext cx="3272998" cy="1179871"/>
           </a:xfrm>
           <a:prstGeom prst="roundRect">
@@ -3815,112 +3815,14 @@
       </p:sp>
       <p:sp>
         <p:nvSpPr>
-          <p:cNvPr id="3" name="Rectangle: Rounded Corners 2"/>
-          <p:cNvSpPr/>
-          <p:nvPr/>
-        </p:nvSpPr>
-        <p:spPr>
-          <a:xfrm>
-            <a:off x="862153" y="2661108"/>
-            <a:ext cx="3272998" cy="1179871"/>
-          </a:xfrm>
-          <a:prstGeom prst="roundRect">
-            <a:avLst/>
-          </a:prstGeom>
-          <a:solidFill>
-            <a:schemeClr val="accent6">
-              <a:lumMod val="60000"/>
-              <a:lumOff val="40000"/>
-            </a:schemeClr>
-          </a:solidFill>
-        </p:spPr>
-        <p:style>
-          <a:lnRef idx="2">
-            <a:schemeClr val="accent1">
-              <a:shade val="50000"/>
-            </a:schemeClr>
-          </a:lnRef>
-          <a:fillRef idx="1">
-            <a:schemeClr val="accent1"/>
-          </a:fillRef>
-          <a:effectRef idx="0">
-            <a:schemeClr val="accent1"/>
-          </a:effectRef>
-          <a:fontRef idx="minor">
-            <a:schemeClr val="lt1"/>
-          </a:fontRef>
-        </p:style>
-        <p:txBody>
-          <a:bodyPr rtlCol="0" anchor="ctr"/>
-          <a:lstStyle/>
-          <a:p>
-            <a:pPr algn="ctr"/>
-            <a:r>
-              <a:rPr lang="en-US" sz="2800" dirty="0"/>
-              <a:t>       RDF                                                      Spreadsheet</a:t>
-            </a:r>
-          </a:p>
-        </p:txBody>
-      </p:sp>
-      <p:sp>
-        <p:nvSpPr>
-          <p:cNvPr id="4" name="Rectangle: Rounded Corners 3"/>
-          <p:cNvSpPr/>
-          <p:nvPr/>
-        </p:nvSpPr>
-        <p:spPr>
-          <a:xfrm>
-            <a:off x="5713634" y="4956676"/>
-            <a:ext cx="3272998" cy="1179871"/>
-          </a:xfrm>
-          <a:prstGeom prst="roundRect">
-            <a:avLst/>
-          </a:prstGeom>
-          <a:solidFill>
-            <a:schemeClr val="accent5">
-              <a:lumMod val="60000"/>
-              <a:lumOff val="40000"/>
-            </a:schemeClr>
-          </a:solidFill>
-        </p:spPr>
-        <p:style>
-          <a:lnRef idx="2">
-            <a:schemeClr val="accent1">
-              <a:shade val="50000"/>
-            </a:schemeClr>
-          </a:lnRef>
-          <a:fillRef idx="1">
-            <a:schemeClr val="accent1"/>
-          </a:fillRef>
-          <a:effectRef idx="0">
-            <a:schemeClr val="accent1"/>
-          </a:effectRef>
-          <a:fontRef idx="minor">
-            <a:schemeClr val="lt1"/>
-          </a:fontRef>
-        </p:style>
-        <p:txBody>
-          <a:bodyPr rtlCol="0" anchor="ctr"/>
-          <a:lstStyle/>
-          <a:p>
-            <a:pPr algn="ctr"/>
-            <a:r>
-              <a:rPr lang="en-US" sz="2800" dirty="0"/>
-              <a:t>RDF</a:t>
-            </a:r>
-          </a:p>
-        </p:txBody>
-      </p:sp>
-      <p:sp>
-        <p:nvSpPr>
           <p:cNvPr id="9" name="Arc 8"/>
           <p:cNvSpPr/>
           <p:nvPr/>
         </p:nvSpPr>
         <p:spPr>
-          <a:xfrm rot="21384502">
-            <a:off x="4611439" y="601708"/>
-            <a:ext cx="914400" cy="695632"/>
+          <a:xfrm rot="5727257" flipV="1">
+            <a:off x="1650985" y="1512553"/>
+            <a:ext cx="668287" cy="1122882"/>
           </a:xfrm>
           <a:prstGeom prst="arc">
             <a:avLst>
@@ -3930,7 +3832,10 @@
           </a:prstGeom>
           <a:ln w="38100">
             <a:solidFill>
-              <a:srgbClr val="FF0000"/>
+              <a:schemeClr val="tx1">
+                <a:lumMod val="65000"/>
+                <a:lumOff val="35000"/>
+              </a:schemeClr>
             </a:solidFill>
             <a:headEnd type="triangle"/>
             <a:tailEnd type="none"/>
@@ -3982,7 +3887,7 @@
         </p:blipFill>
         <p:spPr bwMode="auto">
           <a:xfrm>
-            <a:off x="7995918" y="3708684"/>
+            <a:off x="7858543" y="2340396"/>
             <a:ext cx="806763" cy="559532"/>
           </a:xfrm>
           <a:prstGeom prst="rect">
@@ -4041,47 +3946,135 @@
           </a:extLst>
         </p:spPr>
       </p:pic>
-      <p:pic>
-        <p:nvPicPr>
-          <p:cNvPr id="1030" name="Picture 6" descr="Image result for spreadsheet icon"/>
-          <p:cNvPicPr>
-            <a:picLocks noChangeAspect="1" noChangeArrowheads="1"/>
-          </p:cNvPicPr>
+      <p:grpSp>
+        <p:nvGrpSpPr>
+          <p:cNvPr id="13" name="Group 12"/>
+          <p:cNvGrpSpPr/>
           <p:nvPr/>
-        </p:nvPicPr>
-        <p:blipFill>
-          <a:blip r:embed="rId4">
+        </p:nvGrpSpPr>
+        <p:grpSpPr>
+          <a:xfrm>
+            <a:off x="948500" y="2623605"/>
+            <a:ext cx="3272998" cy="1179871"/>
+            <a:chOff x="862153" y="2808579"/>
+            <a:chExt cx="3272998" cy="1179871"/>
+          </a:xfrm>
+        </p:grpSpPr>
+        <p:sp>
+          <p:nvSpPr>
+            <p:cNvPr id="3" name="Rectangle: Rounded Corners 2"/>
+            <p:cNvSpPr/>
+            <p:nvPr/>
+          </p:nvSpPr>
+          <p:spPr>
+            <a:xfrm>
+              <a:off x="862153" y="2808579"/>
+              <a:ext cx="3272998" cy="1179871"/>
+            </a:xfrm>
+            <a:prstGeom prst="roundRect">
+              <a:avLst/>
+            </a:prstGeom>
+            <a:solidFill>
+              <a:schemeClr val="bg1">
+                <a:lumMod val="85000"/>
+              </a:schemeClr>
+            </a:solidFill>
+          </p:spPr>
+          <p:style>
+            <a:lnRef idx="2">
+              <a:schemeClr val="accent1">
+                <a:shade val="50000"/>
+              </a:schemeClr>
+            </a:lnRef>
+            <a:fillRef idx="1">
+              <a:schemeClr val="accent1"/>
+            </a:fillRef>
+            <a:effectRef idx="0">
+              <a:schemeClr val="accent1"/>
+            </a:effectRef>
+            <a:fontRef idx="minor">
+              <a:schemeClr val="lt1"/>
+            </a:fontRef>
+          </p:style>
+          <p:txBody>
+            <a:bodyPr rtlCol="0" anchor="ctr"/>
+            <a:lstStyle/>
+            <a:p>
+              <a:pPr algn="ctr"/>
+              <a:r>
+                <a:rPr lang="en-US" sz="2800" dirty="0"/>
+                <a:t>   </a:t>
+              </a:r>
+              <a:r>
+                <a:rPr lang="en-US" sz="2800" dirty="0">
+                  <a:solidFill>
+                    <a:schemeClr val="tx1">
+                      <a:lumMod val="50000"/>
+                      <a:lumOff val="50000"/>
+                    </a:schemeClr>
+                  </a:solidFill>
+                </a:rPr>
+                <a:t>RDF</a:t>
+              </a:r>
+            </a:p>
+            <a:p>
+              <a:pPr algn="ctr"/>
+              <a:r>
+                <a:rPr lang="en-US" sz="2800" dirty="0">
+                  <a:solidFill>
+                    <a:schemeClr val="tx1">
+                      <a:lumMod val="50000"/>
+                      <a:lumOff val="50000"/>
+                    </a:schemeClr>
+                  </a:solidFill>
+                </a:rPr>
+                <a:t>          Spreadsheet</a:t>
+              </a:r>
+            </a:p>
+          </p:txBody>
+        </p:sp>
+        <p:pic>
+          <p:nvPicPr>
+            <p:cNvPr id="1030" name="Picture 6" descr="Image result for spreadsheet icon"/>
+            <p:cNvPicPr>
+              <a:picLocks noChangeAspect="1" noChangeArrowheads="1"/>
+            </p:cNvPicPr>
+            <p:nvPr/>
+          </p:nvPicPr>
+          <p:blipFill>
+            <a:blip r:embed="rId4">
+              <a:extLst>
+                <a:ext uri="{28A0092B-C50C-407E-A947-70E740481C1C}">
+                  <a14:useLocalDpi xmlns:a14="http://schemas.microsoft.com/office/drawing/2010/main" val="0"/>
+                </a:ext>
+              </a:extLst>
+            </a:blip>
+            <a:srcRect/>
+            <a:stretch>
+              <a:fillRect/>
+            </a:stretch>
+          </p:blipFill>
+          <p:spPr bwMode="auto">
+            <a:xfrm>
+              <a:off x="862153" y="2976034"/>
+              <a:ext cx="844959" cy="844959"/>
+            </a:xfrm>
+            <a:prstGeom prst="rect">
+              <a:avLst/>
+            </a:prstGeom>
+            <a:noFill/>
             <a:extLst>
-              <a:ext uri="{28A0092B-C50C-407E-A947-70E740481C1C}">
-                <a14:useLocalDpi xmlns:a14="http://schemas.microsoft.com/office/drawing/2010/main" val="0"/>
+              <a:ext uri="{909E8E84-426E-40DD-AFC4-6F175D3DCCD1}">
+                <a14:hiddenFill xmlns:a14="http://schemas.microsoft.com/office/drawing/2010/main">
+                  <a:solidFill>
+                    <a:srgbClr val="FFFFFF"/>
+                  </a:solidFill>
+                </a14:hiddenFill>
               </a:ext>
             </a:extLst>
-          </a:blip>
-          <a:srcRect/>
-          <a:stretch>
-            <a:fillRect/>
-          </a:stretch>
-        </p:blipFill>
-        <p:spPr bwMode="auto">
-          <a:xfrm>
-            <a:off x="891041" y="2792701"/>
-            <a:ext cx="844959" cy="844959"/>
-          </a:xfrm>
-          <a:prstGeom prst="rect">
-            <a:avLst/>
-          </a:prstGeom>
-          <a:noFill/>
-          <a:extLst>
-            <a:ext uri="{909E8E84-426E-40DD-AFC4-6F175D3DCCD1}">
-              <a14:hiddenFill xmlns:a14="http://schemas.microsoft.com/office/drawing/2010/main">
-                <a:solidFill>
-                  <a:srgbClr val="FFFFFF"/>
-                </a:solidFill>
-              </a14:hiddenFill>
-            </a:ext>
-          </a:extLst>
-        </p:spPr>
-      </p:pic>
+          </p:spPr>
+        </p:pic>
+      </p:grpSp>
       <p:pic>
         <p:nvPicPr>
           <p:cNvPr id="12" name="Picture 4" descr="C:\_sandbox\sas\Conferences\PhUSE2014\images\R.png"/>
@@ -4105,7 +4098,7 @@
         </p:blipFill>
         <p:spPr bwMode="auto">
           <a:xfrm>
-            <a:off x="9187414" y="4712779"/>
+            <a:off x="9246112" y="4438479"/>
             <a:ext cx="806763" cy="559532"/>
           </a:xfrm>
           <a:prstGeom prst="rect">
@@ -4123,47 +4116,111 @@
           </a:extLst>
         </p:spPr>
       </p:pic>
-      <p:pic>
-        <p:nvPicPr>
-          <p:cNvPr id="2050" name="Picture 2" descr="Image result for rdf icon"/>
-          <p:cNvPicPr>
-            <a:picLocks noChangeAspect="1" noChangeArrowheads="1"/>
-          </p:cNvPicPr>
+      <p:grpSp>
+        <p:nvGrpSpPr>
+          <p:cNvPr id="2049" name="Group 2048"/>
+          <p:cNvGrpSpPr/>
           <p:nvPr/>
-        </p:nvPicPr>
-        <p:blipFill>
-          <a:blip r:embed="rId5">
+        </p:nvGrpSpPr>
+        <p:grpSpPr>
+          <a:xfrm>
+            <a:off x="5573842" y="3622547"/>
+            <a:ext cx="3272998" cy="1179871"/>
+            <a:chOff x="5573842" y="4043171"/>
+            <a:chExt cx="3272998" cy="1179871"/>
+          </a:xfrm>
+        </p:grpSpPr>
+        <p:sp>
+          <p:nvSpPr>
+            <p:cNvPr id="4" name="Rectangle: Rounded Corners 3"/>
+            <p:cNvSpPr/>
+            <p:nvPr/>
+          </p:nvSpPr>
+          <p:spPr>
+            <a:xfrm>
+              <a:off x="5573842" y="4043171"/>
+              <a:ext cx="3272998" cy="1179871"/>
+            </a:xfrm>
+            <a:prstGeom prst="roundRect">
+              <a:avLst/>
+            </a:prstGeom>
+            <a:solidFill>
+              <a:schemeClr val="accent5">
+                <a:lumMod val="60000"/>
+                <a:lumOff val="40000"/>
+              </a:schemeClr>
+            </a:solidFill>
+          </p:spPr>
+          <p:style>
+            <a:lnRef idx="2">
+              <a:schemeClr val="accent1">
+                <a:shade val="50000"/>
+              </a:schemeClr>
+            </a:lnRef>
+            <a:fillRef idx="1">
+              <a:schemeClr val="accent1"/>
+            </a:fillRef>
+            <a:effectRef idx="0">
+              <a:schemeClr val="accent1"/>
+            </a:effectRef>
+            <a:fontRef idx="minor">
+              <a:schemeClr val="lt1"/>
+            </a:fontRef>
+          </p:style>
+          <p:txBody>
+            <a:bodyPr rtlCol="0" anchor="ctr"/>
+            <a:lstStyle/>
+            <a:p>
+              <a:pPr algn="ctr"/>
+              <a:r>
+                <a:rPr lang="en-US" sz="2800" dirty="0"/>
+                <a:t>RDF</a:t>
+              </a:r>
+            </a:p>
+          </p:txBody>
+        </p:sp>
+        <p:pic>
+          <p:nvPicPr>
+            <p:cNvPr id="2050" name="Picture 2" descr="Image result for rdf icon"/>
+            <p:cNvPicPr>
+              <a:picLocks noChangeAspect="1" noChangeArrowheads="1"/>
+            </p:cNvPicPr>
+            <p:nvPr/>
+          </p:nvPicPr>
+          <p:blipFill>
+            <a:blip r:embed="rId5">
+              <a:extLst>
+                <a:ext uri="{28A0092B-C50C-407E-A947-70E740481C1C}">
+                  <a14:useLocalDpi xmlns:a14="http://schemas.microsoft.com/office/drawing/2010/main" val="0"/>
+                </a:ext>
+              </a:extLst>
+            </a:blip>
+            <a:srcRect/>
+            <a:stretch>
+              <a:fillRect/>
+            </a:stretch>
+          </p:blipFill>
+          <p:spPr bwMode="auto">
+            <a:xfrm>
+              <a:off x="6073092" y="4277709"/>
+              <a:ext cx="677084" cy="720302"/>
+            </a:xfrm>
+            <a:prstGeom prst="rect">
+              <a:avLst/>
+            </a:prstGeom>
+            <a:noFill/>
             <a:extLst>
-              <a:ext uri="{28A0092B-C50C-407E-A947-70E740481C1C}">
-                <a14:useLocalDpi xmlns:a14="http://schemas.microsoft.com/office/drawing/2010/main" val="0"/>
+              <a:ext uri="{909E8E84-426E-40DD-AFC4-6F175D3DCCD1}">
+                <a14:hiddenFill xmlns:a14="http://schemas.microsoft.com/office/drawing/2010/main">
+                  <a:solidFill>
+                    <a:srgbClr val="FFFFFF"/>
+                  </a:solidFill>
+                </a14:hiddenFill>
               </a:ext>
             </a:extLst>
-          </a:blip>
-          <a:srcRect/>
-          <a:stretch>
-            <a:fillRect/>
-          </a:stretch>
-        </p:blipFill>
-        <p:spPr bwMode="auto">
-          <a:xfrm>
-            <a:off x="5914595" y="5136167"/>
-            <a:ext cx="677084" cy="720302"/>
-          </a:xfrm>
-          <a:prstGeom prst="rect">
-            <a:avLst/>
-          </a:prstGeom>
-          <a:noFill/>
-          <a:extLst>
-            <a:ext uri="{909E8E84-426E-40DD-AFC4-6F175D3DCCD1}">
-              <a14:hiddenFill xmlns:a14="http://schemas.microsoft.com/office/drawing/2010/main">
-                <a:solidFill>
-                  <a:srgbClr val="FFFFFF"/>
-                </a:solidFill>
-              </a14:hiddenFill>
-            </a:ext>
-          </a:extLst>
-        </p:spPr>
-      </p:pic>
+          </p:spPr>
+        </p:pic>
+      </p:grpSp>
       <p:pic>
         <p:nvPicPr>
           <p:cNvPr id="2052" name="Picture 4" descr="Image result for network graph icon"/>
@@ -4208,21 +4265,21 @@
       <p:cxnSp>
         <p:nvCxnSpPr>
           <p:cNvPr id="7" name="Straight Arrow Connector 6"/>
-          <p:cNvCxnSpPr>
-            <a:stCxn id="4" idx="3"/>
-            <a:endCxn id="2052" idx="1"/>
-          </p:cNvCxnSpPr>
+          <p:cNvCxnSpPr/>
           <p:nvPr/>
         </p:nvCxnSpPr>
         <p:spPr>
-          <a:xfrm flipV="1">
-            <a:off x="8986632" y="5546611"/>
-            <a:ext cx="1447649" cy="1"/>
+          <a:xfrm>
+            <a:off x="8797074" y="4659998"/>
+            <a:ext cx="1587441" cy="913504"/>
           </a:xfrm>
           <a:prstGeom prst="straightConnector1">
             <a:avLst/>
           </a:prstGeom>
-          <a:ln w="47625">
+          <a:ln w="82550">
+            <a:solidFill>
+              <a:srgbClr val="00B050"/>
+            </a:solidFill>
             <a:tailEnd type="triangle"/>
           </a:ln>
         </p:spPr>
@@ -4278,7 +4335,7 @@
         </p:nvSpPr>
         <p:spPr>
           <a:xfrm>
-            <a:off x="6261250" y="6136547"/>
+            <a:off x="6236388" y="4855140"/>
             <a:ext cx="1883849" cy="523220"/>
           </a:xfrm>
           <a:prstGeom prst="rect">
@@ -4342,79 +4399,30 @@
           </a:p>
         </p:txBody>
       </p:sp>
-      <p:sp>
-        <p:nvSpPr>
-          <p:cNvPr id="21" name="Rectangle: Rounded Corners 20"/>
-          <p:cNvSpPr/>
-          <p:nvPr/>
-        </p:nvSpPr>
-        <p:spPr>
-          <a:xfrm>
-            <a:off x="862153" y="341609"/>
-            <a:ext cx="3272998" cy="1179871"/>
-          </a:xfrm>
-          <a:prstGeom prst="roundRect">
-            <a:avLst/>
-          </a:prstGeom>
-          <a:solidFill>
-            <a:schemeClr val="accent6">
-              <a:lumMod val="60000"/>
-              <a:lumOff val="40000"/>
-            </a:schemeClr>
-          </a:solidFill>
-        </p:spPr>
-        <p:style>
-          <a:lnRef idx="2">
-            <a:schemeClr val="accent1">
-              <a:shade val="50000"/>
-            </a:schemeClr>
-          </a:lnRef>
-          <a:fillRef idx="1">
-            <a:schemeClr val="accent1"/>
-          </a:fillRef>
-          <a:effectRef idx="0">
-            <a:schemeClr val="accent1"/>
-          </a:effectRef>
-          <a:fontRef idx="minor">
-            <a:schemeClr val="lt1"/>
-          </a:fontRef>
-        </p:style>
-        <p:txBody>
-          <a:bodyPr rtlCol="0" anchor="ctr"/>
-          <a:lstStyle/>
-          <a:p>
-            <a:pPr algn="ctr"/>
-            <a:r>
-              <a:rPr lang="en-US" sz="2800" dirty="0"/>
-              <a:t>  Neo4j</a:t>
-            </a:r>
-          </a:p>
-          <a:p>
-            <a:pPr algn="ctr"/>
-            <a:r>
-              <a:rPr lang="en-US" sz="2800" dirty="0"/>
-              <a:t>         Spreadsheet</a:t>
-            </a:r>
-          </a:p>
-        </p:txBody>
-      </p:sp>
       <p:cxnSp>
         <p:nvCxnSpPr>
           <p:cNvPr id="22" name="Straight Arrow Connector 21"/>
           <p:cNvCxnSpPr>
             <a:stCxn id="21" idx="2"/>
+            <a:endCxn id="3" idx="0"/>
           </p:cNvCxnSpPr>
           <p:nvPr/>
         </p:nvCxnSpPr>
         <p:spPr>
           <a:xfrm>
-            <a:off x="2498652" y="1521480"/>
-            <a:ext cx="0" cy="819019"/>
+            <a:off x="2584999" y="1521480"/>
+            <a:ext cx="0" cy="1102125"/>
           </a:xfrm>
           <a:prstGeom prst="straightConnector1">
             <a:avLst/>
           </a:prstGeom>
           <a:ln w="47625">
+            <a:solidFill>
+              <a:schemeClr val="tx1">
+                <a:lumMod val="65000"/>
+                <a:lumOff val="35000"/>
+              </a:schemeClr>
+            </a:solidFill>
             <a:tailEnd type="triangle"/>
           </a:ln>
         </p:spPr>
@@ -4433,47 +4441,135 @@
           </a:fontRef>
         </p:style>
       </p:cxnSp>
-      <p:pic>
-        <p:nvPicPr>
-          <p:cNvPr id="23" name="Picture 6" descr="Image result for spreadsheet icon"/>
-          <p:cNvPicPr>
-            <a:picLocks noChangeAspect="1" noChangeArrowheads="1"/>
-          </p:cNvPicPr>
+      <p:grpSp>
+        <p:nvGrpSpPr>
+          <p:cNvPr id="11" name="Group 10"/>
+          <p:cNvGrpSpPr/>
           <p:nvPr/>
-        </p:nvPicPr>
-        <p:blipFill>
-          <a:blip r:embed="rId4">
+        </p:nvGrpSpPr>
+        <p:grpSpPr>
+          <a:xfrm>
+            <a:off x="948500" y="341609"/>
+            <a:ext cx="3272998" cy="1179871"/>
+            <a:chOff x="862153" y="341609"/>
+            <a:chExt cx="3272998" cy="1179871"/>
+          </a:xfrm>
+        </p:grpSpPr>
+        <p:sp>
+          <p:nvSpPr>
+            <p:cNvPr id="21" name="Rectangle: Rounded Corners 20"/>
+            <p:cNvSpPr/>
+            <p:nvPr/>
+          </p:nvSpPr>
+          <p:spPr>
+            <a:xfrm>
+              <a:off x="862153" y="341609"/>
+              <a:ext cx="3272998" cy="1179871"/>
+            </a:xfrm>
+            <a:prstGeom prst="roundRect">
+              <a:avLst/>
+            </a:prstGeom>
+            <a:solidFill>
+              <a:schemeClr val="bg1">
+                <a:lumMod val="85000"/>
+              </a:schemeClr>
+            </a:solidFill>
+          </p:spPr>
+          <p:style>
+            <a:lnRef idx="2">
+              <a:schemeClr val="accent1">
+                <a:shade val="50000"/>
+              </a:schemeClr>
+            </a:lnRef>
+            <a:fillRef idx="1">
+              <a:schemeClr val="accent1"/>
+            </a:fillRef>
+            <a:effectRef idx="0">
+              <a:schemeClr val="accent1"/>
+            </a:effectRef>
+            <a:fontRef idx="minor">
+              <a:schemeClr val="lt1"/>
+            </a:fontRef>
+          </p:style>
+          <p:txBody>
+            <a:bodyPr rtlCol="0" anchor="ctr"/>
+            <a:lstStyle/>
+            <a:p>
+              <a:pPr algn="ctr"/>
+              <a:r>
+                <a:rPr lang="en-US" sz="2800" dirty="0"/>
+                <a:t>  </a:t>
+              </a:r>
+              <a:r>
+                <a:rPr lang="en-US" sz="2800" dirty="0">
+                  <a:solidFill>
+                    <a:schemeClr val="tx1">
+                      <a:lumMod val="50000"/>
+                      <a:lumOff val="50000"/>
+                    </a:schemeClr>
+                  </a:solidFill>
+                </a:rPr>
+                <a:t>Neo4j</a:t>
+              </a:r>
+            </a:p>
+            <a:p>
+              <a:pPr algn="ctr"/>
+              <a:r>
+                <a:rPr lang="en-US" sz="2800" dirty="0">
+                  <a:solidFill>
+                    <a:schemeClr val="tx1">
+                      <a:lumMod val="50000"/>
+                      <a:lumOff val="50000"/>
+                    </a:schemeClr>
+                  </a:solidFill>
+                </a:rPr>
+                <a:t>         Spreadsheet</a:t>
+              </a:r>
+            </a:p>
+          </p:txBody>
+        </p:sp>
+        <p:pic>
+          <p:nvPicPr>
+            <p:cNvPr id="23" name="Picture 6" descr="Image result for spreadsheet icon"/>
+            <p:cNvPicPr>
+              <a:picLocks noChangeAspect="1" noChangeArrowheads="1"/>
+            </p:cNvPicPr>
+            <p:nvPr/>
+          </p:nvPicPr>
+          <p:blipFill>
+            <a:blip r:embed="rId4">
+              <a:extLst>
+                <a:ext uri="{28A0092B-C50C-407E-A947-70E740481C1C}">
+                  <a14:useLocalDpi xmlns:a14="http://schemas.microsoft.com/office/drawing/2010/main" val="0"/>
+                </a:ext>
+              </a:extLst>
+            </a:blip>
+            <a:srcRect/>
+            <a:stretch>
+              <a:fillRect/>
+            </a:stretch>
+          </p:blipFill>
+          <p:spPr bwMode="auto">
+            <a:xfrm>
+              <a:off x="862153" y="544098"/>
+              <a:ext cx="844959" cy="844959"/>
+            </a:xfrm>
+            <a:prstGeom prst="rect">
+              <a:avLst/>
+            </a:prstGeom>
+            <a:noFill/>
             <a:extLst>
-              <a:ext uri="{28A0092B-C50C-407E-A947-70E740481C1C}">
-                <a14:useLocalDpi xmlns:a14="http://schemas.microsoft.com/office/drawing/2010/main" val="0"/>
+              <a:ext uri="{909E8E84-426E-40DD-AFC4-6F175D3DCCD1}">
+                <a14:hiddenFill xmlns:a14="http://schemas.microsoft.com/office/drawing/2010/main">
+                  <a:solidFill>
+                    <a:srgbClr val="FFFFFF"/>
+                  </a:solidFill>
+                </a14:hiddenFill>
               </a:ext>
             </a:extLst>
-          </a:blip>
-          <a:srcRect/>
-          <a:stretch>
-            <a:fillRect/>
-          </a:stretch>
-        </p:blipFill>
-        <p:spPr bwMode="auto">
-          <a:xfrm>
-            <a:off x="891041" y="931545"/>
-            <a:ext cx="844959" cy="844959"/>
-          </a:xfrm>
-          <a:prstGeom prst="rect">
-            <a:avLst/>
-          </a:prstGeom>
-          <a:noFill/>
-          <a:extLst>
-            <a:ext uri="{909E8E84-426E-40DD-AFC4-6F175D3DCCD1}">
-              <a14:hiddenFill xmlns:a14="http://schemas.microsoft.com/office/drawing/2010/main">
-                <a:solidFill>
-                  <a:srgbClr val="FFFFFF"/>
-                </a:solidFill>
-              </a14:hiddenFill>
-            </a:ext>
-          </a:extLst>
-        </p:spPr>
-      </p:pic>
+          </p:spPr>
+        </p:pic>
+      </p:grpSp>
       <p:pic>
         <p:nvPicPr>
           <p:cNvPr id="24" name="Picture 4" descr="C:\_sandbox\sas\Conferences\PhUSE2014\images\R.png"/>
@@ -4497,7 +4593,7 @@
         </p:blipFill>
         <p:spPr bwMode="auto">
           <a:xfrm>
-            <a:off x="2913520" y="1681089"/>
+            <a:off x="995841" y="1613392"/>
             <a:ext cx="806763" cy="559532"/>
           </a:xfrm>
           <a:prstGeom prst="rect">
@@ -4523,7 +4619,7 @@
         </p:nvSpPr>
         <p:spPr>
           <a:xfrm>
-            <a:off x="7576964" y="4140850"/>
+            <a:off x="7274997" y="2479954"/>
             <a:ext cx="914400" cy="695632"/>
           </a:xfrm>
           <a:prstGeom prst="arc">
@@ -4571,7 +4667,7 @@
         </p:nvSpPr>
         <p:spPr>
           <a:xfrm>
-            <a:off x="5896460" y="1568544"/>
+            <a:off x="5566675" y="966577"/>
             <a:ext cx="3272998" cy="1179871"/>
           </a:xfrm>
           <a:prstGeom prst="roundRect">
@@ -4607,8 +4703,259 @@
             <a:pPr algn="ctr"/>
             <a:r>
               <a:rPr lang="en-US" sz="2800" dirty="0"/>
-              <a:t>       RDF                                                      Spreadsheet</a:t>
-            </a:r>
+              <a:t>     RDF </a:t>
+            </a:r>
+          </a:p>
+          <a:p>
+            <a:pPr algn="ctr"/>
+            <a:r>
+              <a:rPr lang="en-US" sz="2800" dirty="0"/>
+              <a:t>          Spreadsheet</a:t>
+            </a:r>
+          </a:p>
+        </p:txBody>
+      </p:sp>
+      <p:cxnSp>
+        <p:nvCxnSpPr>
+          <p:cNvPr id="26" name="Straight Arrow Connector 25"/>
+          <p:cNvCxnSpPr>
+            <a:stCxn id="3" idx="2"/>
+            <a:endCxn id="2" idx="0"/>
+          </p:cNvCxnSpPr>
+          <p:nvPr/>
+        </p:nvCxnSpPr>
+        <p:spPr>
+          <a:xfrm>
+            <a:off x="2584999" y="3803476"/>
+            <a:ext cx="0" cy="856522"/>
+          </a:xfrm>
+          <a:prstGeom prst="straightConnector1">
+            <a:avLst/>
+          </a:prstGeom>
+          <a:ln w="82550">
+            <a:solidFill>
+              <a:srgbClr val="00B050"/>
+            </a:solidFill>
+            <a:tailEnd type="triangle"/>
+          </a:ln>
+        </p:spPr>
+        <p:style>
+          <a:lnRef idx="1">
+            <a:schemeClr val="accent1"/>
+          </a:lnRef>
+          <a:fillRef idx="0">
+            <a:schemeClr val="accent1"/>
+          </a:fillRef>
+          <a:effectRef idx="0">
+            <a:schemeClr val="accent1"/>
+          </a:effectRef>
+          <a:fontRef idx="minor">
+            <a:schemeClr val="tx1"/>
+          </a:fontRef>
+        </p:style>
+      </p:cxnSp>
+      <p:pic>
+        <p:nvPicPr>
+          <p:cNvPr id="31" name="Picture 6" descr="Image result for spreadsheet icon"/>
+          <p:cNvPicPr>
+            <a:picLocks noChangeAspect="1" noChangeArrowheads="1"/>
+          </p:cNvPicPr>
+          <p:nvPr/>
+        </p:nvPicPr>
+        <p:blipFill>
+          <a:blip r:embed="rId4">
+            <a:extLst>
+              <a:ext uri="{28A0092B-C50C-407E-A947-70E740481C1C}">
+                <a14:useLocalDpi xmlns:a14="http://schemas.microsoft.com/office/drawing/2010/main" val="0"/>
+              </a:ext>
+            </a:extLst>
+          </a:blip>
+          <a:srcRect/>
+          <a:stretch>
+            <a:fillRect/>
+          </a:stretch>
+        </p:blipFill>
+        <p:spPr bwMode="auto">
+          <a:xfrm>
+            <a:off x="5566675" y="1093308"/>
+            <a:ext cx="844959" cy="844959"/>
+          </a:xfrm>
+          <a:prstGeom prst="rect">
+            <a:avLst/>
+          </a:prstGeom>
+          <a:noFill/>
+          <a:extLst>
+            <a:ext uri="{909E8E84-426E-40DD-AFC4-6F175D3DCCD1}">
+              <a14:hiddenFill xmlns:a14="http://schemas.microsoft.com/office/drawing/2010/main">
+                <a:solidFill>
+                  <a:srgbClr val="FFFFFF"/>
+                </a:solidFill>
+              </a14:hiddenFill>
+            </a:ext>
+          </a:extLst>
+        </p:spPr>
+      </p:pic>
+      <p:cxnSp>
+        <p:nvCxnSpPr>
+          <p:cNvPr id="32" name="Straight Arrow Connector 31"/>
+          <p:cNvCxnSpPr>
+            <a:stCxn id="29" idx="2"/>
+            <a:endCxn id="4" idx="0"/>
+          </p:cNvCxnSpPr>
+          <p:nvPr/>
+        </p:nvCxnSpPr>
+        <p:spPr>
+          <a:xfrm>
+            <a:off x="7203174" y="2146448"/>
+            <a:ext cx="7167" cy="1476099"/>
+          </a:xfrm>
+          <a:prstGeom prst="straightConnector1">
+            <a:avLst/>
+          </a:prstGeom>
+          <a:ln w="82550">
+            <a:solidFill>
+              <a:srgbClr val="00B050"/>
+            </a:solidFill>
+            <a:tailEnd type="triangle"/>
+          </a:ln>
+        </p:spPr>
+        <p:style>
+          <a:lnRef idx="1">
+            <a:schemeClr val="accent1"/>
+          </a:lnRef>
+          <a:fillRef idx="0">
+            <a:schemeClr val="accent1"/>
+          </a:fillRef>
+          <a:effectRef idx="0">
+            <a:schemeClr val="accent1"/>
+          </a:effectRef>
+          <a:fontRef idx="minor">
+            <a:schemeClr val="tx1"/>
+          </a:fontRef>
+        </p:style>
+      </p:cxnSp>
+      <p:sp>
+        <p:nvSpPr>
+          <p:cNvPr id="2048" name="Freeform: Shape 2047"/>
+          <p:cNvSpPr/>
+          <p:nvPr/>
+        </p:nvSpPr>
+        <p:spPr>
+          <a:xfrm>
+            <a:off x="4206240" y="1517904"/>
+            <a:ext cx="1353312" cy="3731234"/>
+          </a:xfrm>
+          <a:custGeom>
+            <a:avLst/>
+            <a:gdLst>
+              <a:gd name="connsiteX0" fmla="*/ 0 w 1353312"/>
+              <a:gd name="connsiteY0" fmla="*/ 3712464 h 3731234"/>
+              <a:gd name="connsiteX1" fmla="*/ 658368 w 1353312"/>
+              <a:gd name="connsiteY1" fmla="*/ 3621024 h 3731234"/>
+              <a:gd name="connsiteX2" fmla="*/ 914400 w 1353312"/>
+              <a:gd name="connsiteY2" fmla="*/ 2871216 h 3731234"/>
+              <a:gd name="connsiteX3" fmla="*/ 676656 w 1353312"/>
+              <a:gd name="connsiteY3" fmla="*/ 1572768 h 3731234"/>
+              <a:gd name="connsiteX4" fmla="*/ 365760 w 1353312"/>
+              <a:gd name="connsiteY4" fmla="*/ 512064 h 3731234"/>
+              <a:gd name="connsiteX5" fmla="*/ 640080 w 1353312"/>
+              <a:gd name="connsiteY5" fmla="*/ 91440 h 3731234"/>
+              <a:gd name="connsiteX6" fmla="*/ 1353312 w 1353312"/>
+              <a:gd name="connsiteY6" fmla="*/ 0 h 3731234"/>
+            </a:gdLst>
+            <a:ahLst/>
+            <a:cxnLst>
+              <a:cxn ang="0">
+                <a:pos x="connsiteX0" y="connsiteY0"/>
+              </a:cxn>
+              <a:cxn ang="0">
+                <a:pos x="connsiteX1" y="connsiteY1"/>
+              </a:cxn>
+              <a:cxn ang="0">
+                <a:pos x="connsiteX2" y="connsiteY2"/>
+              </a:cxn>
+              <a:cxn ang="0">
+                <a:pos x="connsiteX3" y="connsiteY3"/>
+              </a:cxn>
+              <a:cxn ang="0">
+                <a:pos x="connsiteX4" y="connsiteY4"/>
+              </a:cxn>
+              <a:cxn ang="0">
+                <a:pos x="connsiteX5" y="connsiteY5"/>
+              </a:cxn>
+              <a:cxn ang="0">
+                <a:pos x="connsiteX6" y="connsiteY6"/>
+              </a:cxn>
+            </a:cxnLst>
+            <a:rect l="l" t="t" r="r" b="b"/>
+            <a:pathLst>
+              <a:path w="1353312" h="3731234">
+                <a:moveTo>
+                  <a:pt x="0" y="3712464"/>
+                </a:moveTo>
+                <a:cubicBezTo>
+                  <a:pt x="252984" y="3736848"/>
+                  <a:pt x="505968" y="3761232"/>
+                  <a:pt x="658368" y="3621024"/>
+                </a:cubicBezTo>
+                <a:cubicBezTo>
+                  <a:pt x="810768" y="3480816"/>
+                  <a:pt x="911352" y="3212592"/>
+                  <a:pt x="914400" y="2871216"/>
+                </a:cubicBezTo>
+                <a:cubicBezTo>
+                  <a:pt x="917448" y="2529840"/>
+                  <a:pt x="768096" y="1965960"/>
+                  <a:pt x="676656" y="1572768"/>
+                </a:cubicBezTo>
+                <a:cubicBezTo>
+                  <a:pt x="585216" y="1179576"/>
+                  <a:pt x="371856" y="758952"/>
+                  <a:pt x="365760" y="512064"/>
+                </a:cubicBezTo>
+                <a:cubicBezTo>
+                  <a:pt x="359664" y="265176"/>
+                  <a:pt x="475488" y="176784"/>
+                  <a:pt x="640080" y="91440"/>
+                </a:cubicBezTo>
+                <a:cubicBezTo>
+                  <a:pt x="804672" y="6096"/>
+                  <a:pt x="1078992" y="3048"/>
+                  <a:pt x="1353312" y="0"/>
+                </a:cubicBezTo>
+              </a:path>
+            </a:pathLst>
+          </a:custGeom>
+          <a:noFill/>
+          <a:ln w="82550">
+            <a:solidFill>
+              <a:srgbClr val="00B050"/>
+            </a:solidFill>
+            <a:tailEnd type="triangle"/>
+          </a:ln>
+        </p:spPr>
+        <p:style>
+          <a:lnRef idx="2">
+            <a:schemeClr val="accent1">
+              <a:shade val="50000"/>
+            </a:schemeClr>
+          </a:lnRef>
+          <a:fillRef idx="1">
+            <a:schemeClr val="accent1"/>
+          </a:fillRef>
+          <a:effectRef idx="0">
+            <a:schemeClr val="accent1"/>
+          </a:effectRef>
+          <a:fontRef idx="minor">
+            <a:schemeClr val="lt1"/>
+          </a:fontRef>
+        </p:style>
+        <p:txBody>
+          <a:bodyPr rtlCol="0" anchor="ctr"/>
+          <a:lstStyle/>
+          <a:p>
+            <a:pPr algn="ctr"/>
+            <a:endParaRPr lang="en-US"/>
           </a:p>
         </p:txBody>
       </p:sp>

</xml_diff>